<commit_message>
asmend the ppt file
</commit_message>
<xml_diff>
--- a/doc/答辩PPT.pptx
+++ b/doc/答辩PPT.pptx
@@ -18,8 +18,8 @@
     <p:sldId id="272" r:id="rId9"/>
     <p:sldId id="271" r:id="rId10"/>
     <p:sldId id="274" r:id="rId11"/>
-    <p:sldId id="275" r:id="rId12"/>
-    <p:sldId id="280" r:id="rId13"/>
+    <p:sldId id="280" r:id="rId12"/>
+    <p:sldId id="275" r:id="rId13"/>
     <p:sldId id="273" r:id="rId14"/>
     <p:sldId id="276" r:id="rId15"/>
     <p:sldId id="266" r:id="rId16"/>
@@ -9592,6 +9592,651 @@
 <file path=ppt/slides/slide11.xml><?xml version="1.0" encoding="utf-8"?>
 <p:sld xmlns:a="http://schemas.openxmlformats.org/drawingml/2006/main" xmlns:r="http://schemas.openxmlformats.org/officeDocument/2006/relationships" xmlns:p="http://schemas.openxmlformats.org/presentationml/2006/main">
   <p:cSld>
+    <p:bg>
+      <p:bgPr>
+        <a:solidFill>
+          <a:schemeClr val="tx1">
+            <a:lumMod val="85000"/>
+            <a:lumOff val="15000"/>
+          </a:schemeClr>
+        </a:solidFill>
+        <a:effectLst/>
+      </p:bgPr>
+    </p:bg>
+    <p:spTree>
+      <p:nvGrpSpPr>
+        <p:cNvPr id="1" name=""/>
+        <p:cNvGrpSpPr/>
+        <p:nvPr/>
+      </p:nvGrpSpPr>
+      <p:grpSpPr>
+        <a:xfrm>
+          <a:off x="0" y="0"/>
+          <a:ext cx="0" cy="0"/>
+          <a:chOff x="0" y="0"/>
+          <a:chExt cx="0" cy="0"/>
+        </a:xfrm>
+      </p:grpSpPr>
+      <p:sp>
+        <p:nvSpPr>
+          <p:cNvPr id="64" name="任意形状 63"/>
+          <p:cNvSpPr/>
+          <p:nvPr/>
+        </p:nvSpPr>
+        <p:spPr>
+          <a:xfrm>
+            <a:off x="-159385" y="234950"/>
+            <a:ext cx="4297680" cy="957580"/>
+          </a:xfrm>
+          <a:custGeom>
+            <a:avLst/>
+            <a:gdLst>
+              <a:gd name="connsiteX0" fmla="*/ 0 w 6893804"/>
+              <a:gd name="connsiteY0" fmla="*/ 0 h 900000"/>
+              <a:gd name="connsiteX1" fmla="*/ 6045131 w 6893804"/>
+              <a:gd name="connsiteY1" fmla="*/ 0 h 900000"/>
+              <a:gd name="connsiteX2" fmla="*/ 6244468 w 6893804"/>
+              <a:gd name="connsiteY2" fmla="*/ 0 h 900000"/>
+              <a:gd name="connsiteX3" fmla="*/ 6893804 w 6893804"/>
+              <a:gd name="connsiteY3" fmla="*/ 0 h 900000"/>
+              <a:gd name="connsiteX4" fmla="*/ 6443804 w 6893804"/>
+              <a:gd name="connsiteY4" fmla="*/ 450000 h 900000"/>
+              <a:gd name="connsiteX5" fmla="*/ 6893804 w 6893804"/>
+              <a:gd name="connsiteY5" fmla="*/ 900000 h 900000"/>
+              <a:gd name="connsiteX6" fmla="*/ 6244468 w 6893804"/>
+              <a:gd name="connsiteY6" fmla="*/ 900000 h 900000"/>
+              <a:gd name="connsiteX7" fmla="*/ 6045131 w 6893804"/>
+              <a:gd name="connsiteY7" fmla="*/ 900000 h 900000"/>
+              <a:gd name="connsiteX8" fmla="*/ 0 w 6893804"/>
+              <a:gd name="connsiteY8" fmla="*/ 900000 h 900000"/>
+            </a:gdLst>
+            <a:ahLst/>
+            <a:cxnLst>
+              <a:cxn ang="0">
+                <a:pos x="connsiteX0" y="connsiteY0"/>
+              </a:cxn>
+              <a:cxn ang="0">
+                <a:pos x="connsiteX1" y="connsiteY1"/>
+              </a:cxn>
+              <a:cxn ang="0">
+                <a:pos x="connsiteX2" y="connsiteY2"/>
+              </a:cxn>
+              <a:cxn ang="0">
+                <a:pos x="connsiteX3" y="connsiteY3"/>
+              </a:cxn>
+              <a:cxn ang="0">
+                <a:pos x="connsiteX4" y="connsiteY4"/>
+              </a:cxn>
+              <a:cxn ang="0">
+                <a:pos x="connsiteX5" y="connsiteY5"/>
+              </a:cxn>
+              <a:cxn ang="0">
+                <a:pos x="connsiteX6" y="connsiteY6"/>
+              </a:cxn>
+              <a:cxn ang="0">
+                <a:pos x="connsiteX7" y="connsiteY7"/>
+              </a:cxn>
+              <a:cxn ang="0">
+                <a:pos x="connsiteX8" y="connsiteY8"/>
+              </a:cxn>
+            </a:cxnLst>
+            <a:rect l="l" t="t" r="r" b="b"/>
+            <a:pathLst>
+              <a:path w="6893804" h="900000">
+                <a:moveTo>
+                  <a:pt x="0" y="0"/>
+                </a:moveTo>
+                <a:lnTo>
+                  <a:pt x="6045131" y="0"/>
+                </a:lnTo>
+                <a:lnTo>
+                  <a:pt x="6244468" y="0"/>
+                </a:lnTo>
+                <a:lnTo>
+                  <a:pt x="6893804" y="0"/>
+                </a:lnTo>
+                <a:lnTo>
+                  <a:pt x="6443804" y="450000"/>
+                </a:lnTo>
+                <a:lnTo>
+                  <a:pt x="6893804" y="900000"/>
+                </a:lnTo>
+                <a:lnTo>
+                  <a:pt x="6244468" y="900000"/>
+                </a:lnTo>
+                <a:lnTo>
+                  <a:pt x="6045131" y="900000"/>
+                </a:lnTo>
+                <a:lnTo>
+                  <a:pt x="0" y="900000"/>
+                </a:lnTo>
+                <a:close/>
+              </a:path>
+            </a:pathLst>
+          </a:custGeom>
+          <a:solidFill>
+            <a:schemeClr val="accent1"/>
+          </a:solidFill>
+          <a:ln>
+            <a:noFill/>
+          </a:ln>
+          <a:effectLst>
+            <a:outerShdw blurRad="50800" dist="76200" dir="2700000" algn="tl" rotWithShape="0">
+              <a:prstClr val="black">
+                <a:alpha val="40000"/>
+              </a:prstClr>
+            </a:outerShdw>
+          </a:effectLst>
+        </p:spPr>
+        <p:style>
+          <a:lnRef idx="1">
+            <a:schemeClr val="accent1"/>
+          </a:lnRef>
+          <a:fillRef idx="3">
+            <a:schemeClr val="accent1"/>
+          </a:fillRef>
+          <a:effectRef idx="2">
+            <a:schemeClr val="accent1"/>
+          </a:effectRef>
+          <a:fontRef idx="minor">
+            <a:schemeClr val="lt1"/>
+          </a:fontRef>
+        </p:style>
+        <p:txBody>
+          <a:bodyPr wrap="square" rtlCol="0" anchor="ctr">
+            <a:noAutofit/>
+          </a:bodyPr>
+          <a:lstStyle/>
+          <a:p>
+            <a:pPr algn="ctr"/>
+            <a:endParaRPr kumimoji="1" lang="zh-CN" altLang="en-US" sz="2400"/>
+          </a:p>
+        </p:txBody>
+      </p:sp>
+      <p:sp>
+        <p:nvSpPr>
+          <p:cNvPr id="2" name="文本框 1"/>
+          <p:cNvSpPr txBox="1"/>
+          <p:nvPr/>
+        </p:nvSpPr>
+        <p:spPr>
+          <a:xfrm>
+            <a:off x="1242060" y="1706880"/>
+            <a:ext cx="10293350" cy="4892675"/>
+          </a:xfrm>
+          <a:prstGeom prst="rect">
+            <a:avLst/>
+          </a:prstGeom>
+          <a:noFill/>
+        </p:spPr>
+        <p:txBody>
+          <a:bodyPr wrap="square" rtlCol="0">
+            <a:spAutoFit/>
+          </a:bodyPr>
+          <a:lstStyle/>
+          <a:p>
+            <a:r>
+              <a:rPr lang="zh-CN" altLang="en-US" sz="3200" dirty="0">
+                <a:solidFill>
+                  <a:schemeClr val="bg1"/>
+                </a:solidFill>
+                <a:latin typeface="微软雅黑" panose="020B0503020204020204" charset="-122"/>
+                <a:ea typeface="微软雅黑" panose="020B0503020204020204" charset="-122"/>
+                <a:sym typeface="+mn-ea"/>
+              </a:rPr>
+              <a:t>对主游戏界面进行调控</a:t>
+            </a:r>
+          </a:p>
+          <a:p>
+            <a:r>
+              <a:rPr lang="en-US" altLang="zh-CN" sz="2800" b="1" dirty="0" err="1">
+                <a:solidFill>
+                  <a:schemeClr val="bg1"/>
+                </a:solidFill>
+                <a:latin typeface="微软雅黑" panose="020B0503020204020204" charset="-122"/>
+                <a:ea typeface="微软雅黑" panose="020B0503020204020204" charset="-122"/>
+                <a:sym typeface="+mn-ea"/>
+              </a:rPr>
+              <a:t>LocalControler</a:t>
+            </a:r>
+            <a:r>
+              <a:rPr lang="en-US" altLang="zh-CN" sz="2800" b="1" dirty="0">
+                <a:solidFill>
+                  <a:schemeClr val="bg1"/>
+                </a:solidFill>
+                <a:latin typeface="微软雅黑" panose="020B0503020204020204" charset="-122"/>
+                <a:ea typeface="微软雅黑" panose="020B0503020204020204" charset="-122"/>
+                <a:sym typeface="+mn-ea"/>
+              </a:rPr>
+              <a:t>: </a:t>
+            </a:r>
+          </a:p>
+          <a:p>
+            <a:r>
+              <a:rPr lang="zh-CN" altLang="en-US" sz="2800" dirty="0">
+                <a:solidFill>
+                  <a:schemeClr val="bg1"/>
+                </a:solidFill>
+                <a:latin typeface="微软雅黑" panose="020B0503020204020204" charset="-122"/>
+                <a:ea typeface="微软雅黑" panose="020B0503020204020204" charset="-122"/>
+                <a:sym typeface="+mn-ea"/>
+              </a:rPr>
+              <a:t>直接与玩家进行交互，获取玩家输入，操控小球的移动、分裂</a:t>
+            </a:r>
+          </a:p>
+          <a:p>
+            <a:r>
+              <a:rPr lang="en-US" altLang="zh-CN" sz="2800" b="1" dirty="0" err="1">
+                <a:solidFill>
+                  <a:schemeClr val="bg1"/>
+                </a:solidFill>
+                <a:latin typeface="微软雅黑" panose="020B0503020204020204" charset="-122"/>
+                <a:ea typeface="微软雅黑" panose="020B0503020204020204" charset="-122"/>
+                <a:sym typeface="+mn-ea"/>
+              </a:rPr>
+              <a:t>NetControler</a:t>
+            </a:r>
+            <a:r>
+              <a:rPr lang="zh-CN" altLang="en-US" sz="2800" b="1" dirty="0">
+                <a:solidFill>
+                  <a:schemeClr val="bg1"/>
+                </a:solidFill>
+                <a:latin typeface="微软雅黑" panose="020B0503020204020204" charset="-122"/>
+                <a:ea typeface="微软雅黑" panose="020B0503020204020204" charset="-122"/>
+                <a:sym typeface="+mn-ea"/>
+              </a:rPr>
+              <a:t>：</a:t>
+            </a:r>
+          </a:p>
+          <a:p>
+            <a:r>
+              <a:rPr lang="zh-CN" altLang="en-US" sz="2800" dirty="0">
+                <a:solidFill>
+                  <a:schemeClr val="bg1"/>
+                </a:solidFill>
+                <a:latin typeface="微软雅黑" panose="020B0503020204020204" charset="-122"/>
+                <a:ea typeface="微软雅黑" panose="020B0503020204020204" charset="-122"/>
+                <a:sym typeface="+mn-ea"/>
+              </a:rPr>
+              <a:t>通过网络端发送的指令控制小球的移动和分裂</a:t>
+            </a:r>
+          </a:p>
+          <a:p>
+            <a:r>
+              <a:rPr lang="en-US" altLang="zh-CN" sz="2800" b="1" dirty="0" err="1">
+                <a:solidFill>
+                  <a:schemeClr val="bg1"/>
+                </a:solidFill>
+                <a:latin typeface="微软雅黑" panose="020B0503020204020204" charset="-122"/>
+                <a:ea typeface="微软雅黑" panose="020B0503020204020204" charset="-122"/>
+                <a:sym typeface="+mn-ea"/>
+              </a:rPr>
+              <a:t>GameControler</a:t>
+            </a:r>
+            <a:r>
+              <a:rPr lang="zh-CN" altLang="en-US" sz="2800" b="1" dirty="0">
+                <a:solidFill>
+                  <a:schemeClr val="bg1"/>
+                </a:solidFill>
+                <a:latin typeface="微软雅黑" panose="020B0503020204020204" charset="-122"/>
+                <a:ea typeface="微软雅黑" panose="020B0503020204020204" charset="-122"/>
+                <a:sym typeface="+mn-ea"/>
+              </a:rPr>
+              <a:t>：</a:t>
+            </a:r>
+          </a:p>
+          <a:p>
+            <a:r>
+              <a:rPr lang="zh-CN" altLang="en-US" sz="2800" dirty="0">
+                <a:solidFill>
+                  <a:schemeClr val="bg1"/>
+                </a:solidFill>
+                <a:latin typeface="微软雅黑" panose="020B0503020204020204" charset="-122"/>
+                <a:ea typeface="微软雅黑" panose="020B0503020204020204" charset="-122"/>
+                <a:sym typeface="+mn-ea"/>
+              </a:rPr>
+              <a:t>游戏主界面的主调控类，统合本地部分与网络部分</a:t>
+            </a:r>
+          </a:p>
+          <a:p>
+            <a:r>
+              <a:rPr lang="zh-CN" altLang="en-US" sz="2800" dirty="0">
+                <a:solidFill>
+                  <a:schemeClr val="bg1"/>
+                </a:solidFill>
+                <a:latin typeface="微软雅黑" panose="020B0503020204020204" charset="-122"/>
+                <a:ea typeface="微软雅黑" panose="020B0503020204020204" charset="-122"/>
+                <a:sym typeface="+mn-ea"/>
+              </a:rPr>
+              <a:t>从</a:t>
+            </a:r>
+            <a:r>
+              <a:rPr lang="en-US" altLang="zh-CN" sz="2800" dirty="0">
+                <a:solidFill>
+                  <a:schemeClr val="bg1"/>
+                </a:solidFill>
+                <a:latin typeface="微软雅黑" panose="020B0503020204020204" charset="-122"/>
+                <a:ea typeface="微软雅黑" panose="020B0503020204020204" charset="-122"/>
+                <a:sym typeface="+mn-ea"/>
+              </a:rPr>
+              <a:t>Server</a:t>
+            </a:r>
+            <a:r>
+              <a:rPr lang="zh-CN" altLang="en-US" sz="2800" dirty="0">
+                <a:solidFill>
+                  <a:schemeClr val="bg1"/>
+                </a:solidFill>
+                <a:latin typeface="微软雅黑" panose="020B0503020204020204" charset="-122"/>
+                <a:ea typeface="微软雅黑" panose="020B0503020204020204" charset="-122"/>
+                <a:sym typeface="+mn-ea"/>
+              </a:rPr>
+              <a:t>或</a:t>
+            </a:r>
+            <a:r>
+              <a:rPr lang="en-US" altLang="zh-CN" sz="2800" dirty="0">
+                <a:solidFill>
+                  <a:schemeClr val="bg1"/>
+                </a:solidFill>
+                <a:latin typeface="微软雅黑" panose="020B0503020204020204" charset="-122"/>
+                <a:ea typeface="微软雅黑" panose="020B0503020204020204" charset="-122"/>
+                <a:sym typeface="+mn-ea"/>
+              </a:rPr>
+              <a:t>Client</a:t>
+            </a:r>
+            <a:r>
+              <a:rPr lang="zh-CN" altLang="en-US" sz="2800" dirty="0">
+                <a:solidFill>
+                  <a:schemeClr val="bg1"/>
+                </a:solidFill>
+                <a:latin typeface="微软雅黑" panose="020B0503020204020204" charset="-122"/>
+                <a:ea typeface="微软雅黑" panose="020B0503020204020204" charset="-122"/>
+                <a:sym typeface="+mn-ea"/>
+              </a:rPr>
+              <a:t>获取指令并处理，同时将本地数据交予</a:t>
+            </a:r>
+            <a:r>
+              <a:rPr lang="en-US" altLang="zh-CN" sz="2800" dirty="0">
+                <a:solidFill>
+                  <a:schemeClr val="bg1"/>
+                </a:solidFill>
+                <a:latin typeface="微软雅黑" panose="020B0503020204020204" charset="-122"/>
+                <a:ea typeface="微软雅黑" panose="020B0503020204020204" charset="-122"/>
+                <a:sym typeface="+mn-ea"/>
+              </a:rPr>
+              <a:t>Server</a:t>
+            </a:r>
+            <a:r>
+              <a:rPr lang="zh-CN" altLang="en-US" sz="2800" dirty="0">
+                <a:solidFill>
+                  <a:schemeClr val="bg1"/>
+                </a:solidFill>
+                <a:latin typeface="微软雅黑" panose="020B0503020204020204" charset="-122"/>
+                <a:ea typeface="微软雅黑" panose="020B0503020204020204" charset="-122"/>
+                <a:sym typeface="+mn-ea"/>
+              </a:rPr>
+              <a:t>或</a:t>
+            </a:r>
+            <a:r>
+              <a:rPr lang="en-US" altLang="zh-CN" sz="2800" dirty="0">
+                <a:solidFill>
+                  <a:schemeClr val="bg1"/>
+                </a:solidFill>
+                <a:latin typeface="微软雅黑" panose="020B0503020204020204" charset="-122"/>
+                <a:ea typeface="微软雅黑" panose="020B0503020204020204" charset="-122"/>
+                <a:sym typeface="+mn-ea"/>
+              </a:rPr>
+              <a:t>Client</a:t>
+            </a:r>
+            <a:r>
+              <a:rPr lang="zh-CN" altLang="en-US" sz="2800" dirty="0">
+                <a:solidFill>
+                  <a:schemeClr val="bg1"/>
+                </a:solidFill>
+                <a:latin typeface="微软雅黑" panose="020B0503020204020204" charset="-122"/>
+                <a:ea typeface="微软雅黑" panose="020B0503020204020204" charset="-122"/>
+                <a:sym typeface="+mn-ea"/>
+              </a:rPr>
+              <a:t>传输</a:t>
+            </a:r>
+          </a:p>
+          <a:p>
+            <a:r>
+              <a:rPr lang="zh-CN" altLang="en-US" sz="2800" dirty="0">
+                <a:solidFill>
+                  <a:schemeClr val="bg1"/>
+                </a:solidFill>
+                <a:latin typeface="微软雅黑" panose="020B0503020204020204" charset="-122"/>
+                <a:ea typeface="微软雅黑" panose="020B0503020204020204" charset="-122"/>
+                <a:sym typeface="+mn-ea"/>
+              </a:rPr>
+              <a:t>实现地图随小球滚动</a:t>
+            </a:r>
+          </a:p>
+          <a:p>
+            <a:r>
+              <a:rPr lang="zh-CN" altLang="en-US" sz="2800" dirty="0">
+                <a:solidFill>
+                  <a:schemeClr val="bg1"/>
+                </a:solidFill>
+                <a:latin typeface="微软雅黑" panose="020B0503020204020204" charset="-122"/>
+                <a:ea typeface="微软雅黑" panose="020B0503020204020204" charset="-122"/>
+                <a:sym typeface="+mn-ea"/>
+              </a:rPr>
+              <a:t>吞噬和生成新球的操作都是在</a:t>
+            </a:r>
+            <a:r>
+              <a:rPr lang="en-US" altLang="zh-CN" sz="2800" dirty="0" err="1">
+                <a:solidFill>
+                  <a:schemeClr val="bg1"/>
+                </a:solidFill>
+                <a:latin typeface="微软雅黑" panose="020B0503020204020204" charset="-122"/>
+                <a:ea typeface="微软雅黑" panose="020B0503020204020204" charset="-122"/>
+                <a:sym typeface="+mn-ea"/>
+              </a:rPr>
+              <a:t>GameControler</a:t>
+            </a:r>
+            <a:r>
+              <a:rPr lang="zh-CN" altLang="en-US" sz="2800" dirty="0">
+                <a:solidFill>
+                  <a:schemeClr val="bg1"/>
+                </a:solidFill>
+                <a:latin typeface="微软雅黑" panose="020B0503020204020204" charset="-122"/>
+                <a:ea typeface="微软雅黑" panose="020B0503020204020204" charset="-122"/>
+                <a:sym typeface="+mn-ea"/>
+              </a:rPr>
+              <a:t>类中进行</a:t>
+            </a:r>
+          </a:p>
+        </p:txBody>
+      </p:sp>
+      <p:sp>
+        <p:nvSpPr>
+          <p:cNvPr id="3" name="文本框 2"/>
+          <p:cNvSpPr txBox="1"/>
+          <p:nvPr/>
+        </p:nvSpPr>
+        <p:spPr>
+          <a:xfrm>
+            <a:off x="330200" y="369570"/>
+            <a:ext cx="3502660" cy="645160"/>
+          </a:xfrm>
+          <a:prstGeom prst="rect">
+            <a:avLst/>
+          </a:prstGeom>
+          <a:noFill/>
+        </p:spPr>
+        <p:txBody>
+          <a:bodyPr wrap="square" rtlCol="0">
+            <a:spAutoFit/>
+          </a:bodyPr>
+          <a:lstStyle/>
+          <a:p>
+            <a:r>
+              <a:rPr lang="en-US" altLang="zh-CN" sz="3600">
+                <a:solidFill>
+                  <a:schemeClr val="bg1"/>
+                </a:solidFill>
+                <a:latin typeface="微软雅黑" panose="020B0503020204020204" charset="-122"/>
+                <a:ea typeface="微软雅黑" panose="020B0503020204020204" charset="-122"/>
+              </a:rPr>
+              <a:t>Controler</a:t>
+            </a:r>
+            <a:r>
+              <a:rPr lang="zh-CN" altLang="en-US" sz="3600">
+                <a:solidFill>
+                  <a:schemeClr val="bg1"/>
+                </a:solidFill>
+                <a:latin typeface="微软雅黑" panose="020B0503020204020204" charset="-122"/>
+                <a:ea typeface="微软雅黑" panose="020B0503020204020204" charset="-122"/>
+              </a:rPr>
+              <a:t>类</a:t>
+            </a:r>
+          </a:p>
+        </p:txBody>
+      </p:sp>
+      <p:sp>
+        <p:nvSpPr>
+          <p:cNvPr id="12" name="椭圆 11"/>
+          <p:cNvSpPr/>
+          <p:nvPr/>
+        </p:nvSpPr>
+        <p:spPr>
+          <a:xfrm>
+            <a:off x="1109345" y="2388235"/>
+            <a:ext cx="132715" cy="132715"/>
+          </a:xfrm>
+          <a:prstGeom prst="ellipse">
+            <a:avLst/>
+          </a:prstGeom>
+        </p:spPr>
+        <p:style>
+          <a:lnRef idx="2">
+            <a:schemeClr val="accent1">
+              <a:shade val="50000"/>
+            </a:schemeClr>
+          </a:lnRef>
+          <a:fillRef idx="1">
+            <a:schemeClr val="accent1"/>
+          </a:fillRef>
+          <a:effectRef idx="0">
+            <a:schemeClr val="accent1"/>
+          </a:effectRef>
+          <a:fontRef idx="minor">
+            <a:schemeClr val="lt1"/>
+          </a:fontRef>
+        </p:style>
+        <p:txBody>
+          <a:bodyPr rtlCol="0" anchor="ctr"/>
+          <a:lstStyle/>
+          <a:p>
+            <a:pPr algn="ctr"/>
+            <a:endParaRPr lang="zh-CN" altLang="en-US"/>
+          </a:p>
+        </p:txBody>
+      </p:sp>
+      <p:sp>
+        <p:nvSpPr>
+          <p:cNvPr id="4" name="椭圆 3"/>
+          <p:cNvSpPr/>
+          <p:nvPr/>
+        </p:nvSpPr>
+        <p:spPr>
+          <a:xfrm>
+            <a:off x="1109345" y="3246120"/>
+            <a:ext cx="132715" cy="132715"/>
+          </a:xfrm>
+          <a:prstGeom prst="ellipse">
+            <a:avLst/>
+          </a:prstGeom>
+        </p:spPr>
+        <p:style>
+          <a:lnRef idx="2">
+            <a:schemeClr val="accent1">
+              <a:shade val="50000"/>
+            </a:schemeClr>
+          </a:lnRef>
+          <a:fillRef idx="1">
+            <a:schemeClr val="accent1"/>
+          </a:fillRef>
+          <a:effectRef idx="0">
+            <a:schemeClr val="accent1"/>
+          </a:effectRef>
+          <a:fontRef idx="minor">
+            <a:schemeClr val="lt1"/>
+          </a:fontRef>
+        </p:style>
+        <p:txBody>
+          <a:bodyPr rtlCol="0" anchor="ctr"/>
+          <a:lstStyle/>
+          <a:p>
+            <a:pPr algn="ctr"/>
+            <a:endParaRPr lang="zh-CN" altLang="en-US"/>
+          </a:p>
+        </p:txBody>
+      </p:sp>
+      <p:sp>
+        <p:nvSpPr>
+          <p:cNvPr id="6" name="椭圆 5"/>
+          <p:cNvSpPr/>
+          <p:nvPr/>
+        </p:nvSpPr>
+        <p:spPr>
+          <a:xfrm>
+            <a:off x="1109345" y="4086860"/>
+            <a:ext cx="132715" cy="132715"/>
+          </a:xfrm>
+          <a:prstGeom prst="ellipse">
+            <a:avLst/>
+          </a:prstGeom>
+        </p:spPr>
+        <p:style>
+          <a:lnRef idx="2">
+            <a:schemeClr val="accent1">
+              <a:shade val="50000"/>
+            </a:schemeClr>
+          </a:lnRef>
+          <a:fillRef idx="1">
+            <a:schemeClr val="accent1"/>
+          </a:fillRef>
+          <a:effectRef idx="0">
+            <a:schemeClr val="accent1"/>
+          </a:effectRef>
+          <a:fontRef idx="minor">
+            <a:schemeClr val="lt1"/>
+          </a:fontRef>
+        </p:style>
+        <p:txBody>
+          <a:bodyPr rtlCol="0" anchor="ctr"/>
+          <a:lstStyle/>
+          <a:p>
+            <a:pPr algn="ctr"/>
+            <a:endParaRPr lang="zh-CN" altLang="en-US"/>
+          </a:p>
+        </p:txBody>
+      </p:sp>
+    </p:spTree>
+  </p:cSld>
+  <p:clrMapOvr>
+    <a:masterClrMapping/>
+  </p:clrMapOvr>
+  <mc:AlternateContent xmlns:mc="http://schemas.openxmlformats.org/markup-compatibility/2006" xmlns:p14="http://schemas.microsoft.com/office/powerpoint/2010/main">
+    <mc:Choice Requires="p14">
+      <p:transition spd="slow" p14:dur="800">
+        <p:fade/>
+      </p:transition>
+    </mc:Choice>
+    <mc:Fallback xmlns="">
+      <p:transition spd="slow">
+        <p:fade/>
+      </p:transition>
+    </mc:Fallback>
+  </mc:AlternateContent>
+</p:sld>
+</file>
+
+<file path=ppt/slides/slide12.xml><?xml version="1.0" encoding="utf-8"?>
+<p:sld xmlns:a="http://schemas.openxmlformats.org/drawingml/2006/main" xmlns:r="http://schemas.openxmlformats.org/officeDocument/2006/relationships" xmlns:p="http://schemas.openxmlformats.org/presentationml/2006/main">
+  <p:cSld>
     <p:spTree>
       <p:nvGrpSpPr>
         <p:cNvPr id="1" name=""/>
@@ -10568,651 +11213,6 @@
   <p:transition spd="slow">
     <p:fade/>
   </p:transition>
-</p:sld>
-</file>
-
-<file path=ppt/slides/slide12.xml><?xml version="1.0" encoding="utf-8"?>
-<p:sld xmlns:a="http://schemas.openxmlformats.org/drawingml/2006/main" xmlns:r="http://schemas.openxmlformats.org/officeDocument/2006/relationships" xmlns:p="http://schemas.openxmlformats.org/presentationml/2006/main">
-  <p:cSld>
-    <p:bg>
-      <p:bgPr>
-        <a:solidFill>
-          <a:schemeClr val="tx1">
-            <a:lumMod val="85000"/>
-            <a:lumOff val="15000"/>
-          </a:schemeClr>
-        </a:solidFill>
-        <a:effectLst/>
-      </p:bgPr>
-    </p:bg>
-    <p:spTree>
-      <p:nvGrpSpPr>
-        <p:cNvPr id="1" name=""/>
-        <p:cNvGrpSpPr/>
-        <p:nvPr/>
-      </p:nvGrpSpPr>
-      <p:grpSpPr>
-        <a:xfrm>
-          <a:off x="0" y="0"/>
-          <a:ext cx="0" cy="0"/>
-          <a:chOff x="0" y="0"/>
-          <a:chExt cx="0" cy="0"/>
-        </a:xfrm>
-      </p:grpSpPr>
-      <p:sp>
-        <p:nvSpPr>
-          <p:cNvPr id="64" name="任意形状 63"/>
-          <p:cNvSpPr/>
-          <p:nvPr/>
-        </p:nvSpPr>
-        <p:spPr>
-          <a:xfrm>
-            <a:off x="-159385" y="234950"/>
-            <a:ext cx="4297680" cy="957580"/>
-          </a:xfrm>
-          <a:custGeom>
-            <a:avLst/>
-            <a:gdLst>
-              <a:gd name="connsiteX0" fmla="*/ 0 w 6893804"/>
-              <a:gd name="connsiteY0" fmla="*/ 0 h 900000"/>
-              <a:gd name="connsiteX1" fmla="*/ 6045131 w 6893804"/>
-              <a:gd name="connsiteY1" fmla="*/ 0 h 900000"/>
-              <a:gd name="connsiteX2" fmla="*/ 6244468 w 6893804"/>
-              <a:gd name="connsiteY2" fmla="*/ 0 h 900000"/>
-              <a:gd name="connsiteX3" fmla="*/ 6893804 w 6893804"/>
-              <a:gd name="connsiteY3" fmla="*/ 0 h 900000"/>
-              <a:gd name="connsiteX4" fmla="*/ 6443804 w 6893804"/>
-              <a:gd name="connsiteY4" fmla="*/ 450000 h 900000"/>
-              <a:gd name="connsiteX5" fmla="*/ 6893804 w 6893804"/>
-              <a:gd name="connsiteY5" fmla="*/ 900000 h 900000"/>
-              <a:gd name="connsiteX6" fmla="*/ 6244468 w 6893804"/>
-              <a:gd name="connsiteY6" fmla="*/ 900000 h 900000"/>
-              <a:gd name="connsiteX7" fmla="*/ 6045131 w 6893804"/>
-              <a:gd name="connsiteY7" fmla="*/ 900000 h 900000"/>
-              <a:gd name="connsiteX8" fmla="*/ 0 w 6893804"/>
-              <a:gd name="connsiteY8" fmla="*/ 900000 h 900000"/>
-            </a:gdLst>
-            <a:ahLst/>
-            <a:cxnLst>
-              <a:cxn ang="0">
-                <a:pos x="connsiteX0" y="connsiteY0"/>
-              </a:cxn>
-              <a:cxn ang="0">
-                <a:pos x="connsiteX1" y="connsiteY1"/>
-              </a:cxn>
-              <a:cxn ang="0">
-                <a:pos x="connsiteX2" y="connsiteY2"/>
-              </a:cxn>
-              <a:cxn ang="0">
-                <a:pos x="connsiteX3" y="connsiteY3"/>
-              </a:cxn>
-              <a:cxn ang="0">
-                <a:pos x="connsiteX4" y="connsiteY4"/>
-              </a:cxn>
-              <a:cxn ang="0">
-                <a:pos x="connsiteX5" y="connsiteY5"/>
-              </a:cxn>
-              <a:cxn ang="0">
-                <a:pos x="connsiteX6" y="connsiteY6"/>
-              </a:cxn>
-              <a:cxn ang="0">
-                <a:pos x="connsiteX7" y="connsiteY7"/>
-              </a:cxn>
-              <a:cxn ang="0">
-                <a:pos x="connsiteX8" y="connsiteY8"/>
-              </a:cxn>
-            </a:cxnLst>
-            <a:rect l="l" t="t" r="r" b="b"/>
-            <a:pathLst>
-              <a:path w="6893804" h="900000">
-                <a:moveTo>
-                  <a:pt x="0" y="0"/>
-                </a:moveTo>
-                <a:lnTo>
-                  <a:pt x="6045131" y="0"/>
-                </a:lnTo>
-                <a:lnTo>
-                  <a:pt x="6244468" y="0"/>
-                </a:lnTo>
-                <a:lnTo>
-                  <a:pt x="6893804" y="0"/>
-                </a:lnTo>
-                <a:lnTo>
-                  <a:pt x="6443804" y="450000"/>
-                </a:lnTo>
-                <a:lnTo>
-                  <a:pt x="6893804" y="900000"/>
-                </a:lnTo>
-                <a:lnTo>
-                  <a:pt x="6244468" y="900000"/>
-                </a:lnTo>
-                <a:lnTo>
-                  <a:pt x="6045131" y="900000"/>
-                </a:lnTo>
-                <a:lnTo>
-                  <a:pt x="0" y="900000"/>
-                </a:lnTo>
-                <a:close/>
-              </a:path>
-            </a:pathLst>
-          </a:custGeom>
-          <a:solidFill>
-            <a:schemeClr val="accent1"/>
-          </a:solidFill>
-          <a:ln>
-            <a:noFill/>
-          </a:ln>
-          <a:effectLst>
-            <a:outerShdw blurRad="50800" dist="76200" dir="2700000" algn="tl" rotWithShape="0">
-              <a:prstClr val="black">
-                <a:alpha val="40000"/>
-              </a:prstClr>
-            </a:outerShdw>
-          </a:effectLst>
-        </p:spPr>
-        <p:style>
-          <a:lnRef idx="1">
-            <a:schemeClr val="accent1"/>
-          </a:lnRef>
-          <a:fillRef idx="3">
-            <a:schemeClr val="accent1"/>
-          </a:fillRef>
-          <a:effectRef idx="2">
-            <a:schemeClr val="accent1"/>
-          </a:effectRef>
-          <a:fontRef idx="minor">
-            <a:schemeClr val="lt1"/>
-          </a:fontRef>
-        </p:style>
-        <p:txBody>
-          <a:bodyPr wrap="square" rtlCol="0" anchor="ctr">
-            <a:noAutofit/>
-          </a:bodyPr>
-          <a:lstStyle/>
-          <a:p>
-            <a:pPr algn="ctr"/>
-            <a:endParaRPr kumimoji="1" lang="zh-CN" altLang="en-US" sz="2400"/>
-          </a:p>
-        </p:txBody>
-      </p:sp>
-      <p:sp>
-        <p:nvSpPr>
-          <p:cNvPr id="2" name="文本框 1"/>
-          <p:cNvSpPr txBox="1"/>
-          <p:nvPr/>
-        </p:nvSpPr>
-        <p:spPr>
-          <a:xfrm>
-            <a:off x="1242060" y="1706880"/>
-            <a:ext cx="10293350" cy="4892675"/>
-          </a:xfrm>
-          <a:prstGeom prst="rect">
-            <a:avLst/>
-          </a:prstGeom>
-          <a:noFill/>
-        </p:spPr>
-        <p:txBody>
-          <a:bodyPr wrap="square" rtlCol="0">
-            <a:spAutoFit/>
-          </a:bodyPr>
-          <a:lstStyle/>
-          <a:p>
-            <a:r>
-              <a:rPr lang="zh-CN" altLang="en-US" sz="3200" dirty="0">
-                <a:solidFill>
-                  <a:schemeClr val="bg1"/>
-                </a:solidFill>
-                <a:latin typeface="微软雅黑" panose="020B0503020204020204" charset="-122"/>
-                <a:ea typeface="微软雅黑" panose="020B0503020204020204" charset="-122"/>
-                <a:sym typeface="+mn-ea"/>
-              </a:rPr>
-              <a:t>对主游戏界面进行调控</a:t>
-            </a:r>
-          </a:p>
-          <a:p>
-            <a:r>
-              <a:rPr lang="en-US" altLang="zh-CN" sz="2800" b="1" dirty="0" err="1">
-                <a:solidFill>
-                  <a:schemeClr val="bg1"/>
-                </a:solidFill>
-                <a:latin typeface="微软雅黑" panose="020B0503020204020204" charset="-122"/>
-                <a:ea typeface="微软雅黑" panose="020B0503020204020204" charset="-122"/>
-                <a:sym typeface="+mn-ea"/>
-              </a:rPr>
-              <a:t>LocalControler</a:t>
-            </a:r>
-            <a:r>
-              <a:rPr lang="en-US" altLang="zh-CN" sz="2800" b="1" dirty="0">
-                <a:solidFill>
-                  <a:schemeClr val="bg1"/>
-                </a:solidFill>
-                <a:latin typeface="微软雅黑" panose="020B0503020204020204" charset="-122"/>
-                <a:ea typeface="微软雅黑" panose="020B0503020204020204" charset="-122"/>
-                <a:sym typeface="+mn-ea"/>
-              </a:rPr>
-              <a:t>: </a:t>
-            </a:r>
-          </a:p>
-          <a:p>
-            <a:r>
-              <a:rPr lang="zh-CN" altLang="en-US" sz="2800" dirty="0">
-                <a:solidFill>
-                  <a:schemeClr val="bg1"/>
-                </a:solidFill>
-                <a:latin typeface="微软雅黑" panose="020B0503020204020204" charset="-122"/>
-                <a:ea typeface="微软雅黑" panose="020B0503020204020204" charset="-122"/>
-                <a:sym typeface="+mn-ea"/>
-              </a:rPr>
-              <a:t>直接与玩家进行交互，获取玩家输入，操控小球的移动、分裂</a:t>
-            </a:r>
-          </a:p>
-          <a:p>
-            <a:r>
-              <a:rPr lang="en-US" altLang="zh-CN" sz="2800" b="1" dirty="0" err="1">
-                <a:solidFill>
-                  <a:schemeClr val="bg1"/>
-                </a:solidFill>
-                <a:latin typeface="微软雅黑" panose="020B0503020204020204" charset="-122"/>
-                <a:ea typeface="微软雅黑" panose="020B0503020204020204" charset="-122"/>
-                <a:sym typeface="+mn-ea"/>
-              </a:rPr>
-              <a:t>NetControler</a:t>
-            </a:r>
-            <a:r>
-              <a:rPr lang="zh-CN" altLang="en-US" sz="2800" b="1" dirty="0">
-                <a:solidFill>
-                  <a:schemeClr val="bg1"/>
-                </a:solidFill>
-                <a:latin typeface="微软雅黑" panose="020B0503020204020204" charset="-122"/>
-                <a:ea typeface="微软雅黑" panose="020B0503020204020204" charset="-122"/>
-                <a:sym typeface="+mn-ea"/>
-              </a:rPr>
-              <a:t>：</a:t>
-            </a:r>
-          </a:p>
-          <a:p>
-            <a:r>
-              <a:rPr lang="zh-CN" altLang="en-US" sz="2800" dirty="0">
-                <a:solidFill>
-                  <a:schemeClr val="bg1"/>
-                </a:solidFill>
-                <a:latin typeface="微软雅黑" panose="020B0503020204020204" charset="-122"/>
-                <a:ea typeface="微软雅黑" panose="020B0503020204020204" charset="-122"/>
-                <a:sym typeface="+mn-ea"/>
-              </a:rPr>
-              <a:t>通过网络端发送的指令控制小球的移动和分裂</a:t>
-            </a:r>
-          </a:p>
-          <a:p>
-            <a:r>
-              <a:rPr lang="en-US" altLang="zh-CN" sz="2800" b="1" dirty="0" err="1">
-                <a:solidFill>
-                  <a:schemeClr val="bg1"/>
-                </a:solidFill>
-                <a:latin typeface="微软雅黑" panose="020B0503020204020204" charset="-122"/>
-                <a:ea typeface="微软雅黑" panose="020B0503020204020204" charset="-122"/>
-                <a:sym typeface="+mn-ea"/>
-              </a:rPr>
-              <a:t>GameControler</a:t>
-            </a:r>
-            <a:r>
-              <a:rPr lang="zh-CN" altLang="en-US" sz="2800" b="1" dirty="0">
-                <a:solidFill>
-                  <a:schemeClr val="bg1"/>
-                </a:solidFill>
-                <a:latin typeface="微软雅黑" panose="020B0503020204020204" charset="-122"/>
-                <a:ea typeface="微软雅黑" panose="020B0503020204020204" charset="-122"/>
-                <a:sym typeface="+mn-ea"/>
-              </a:rPr>
-              <a:t>：</a:t>
-            </a:r>
-          </a:p>
-          <a:p>
-            <a:r>
-              <a:rPr lang="zh-CN" altLang="en-US" sz="2800" dirty="0">
-                <a:solidFill>
-                  <a:schemeClr val="bg1"/>
-                </a:solidFill>
-                <a:latin typeface="微软雅黑" panose="020B0503020204020204" charset="-122"/>
-                <a:ea typeface="微软雅黑" panose="020B0503020204020204" charset="-122"/>
-                <a:sym typeface="+mn-ea"/>
-              </a:rPr>
-              <a:t>游戏主界面的主调控类，统合本地部分与网络部分</a:t>
-            </a:r>
-          </a:p>
-          <a:p>
-            <a:r>
-              <a:rPr lang="zh-CN" altLang="en-US" sz="2800" dirty="0">
-                <a:solidFill>
-                  <a:schemeClr val="bg1"/>
-                </a:solidFill>
-                <a:latin typeface="微软雅黑" panose="020B0503020204020204" charset="-122"/>
-                <a:ea typeface="微软雅黑" panose="020B0503020204020204" charset="-122"/>
-                <a:sym typeface="+mn-ea"/>
-              </a:rPr>
-              <a:t>从</a:t>
-            </a:r>
-            <a:r>
-              <a:rPr lang="en-US" altLang="zh-CN" sz="2800" dirty="0">
-                <a:solidFill>
-                  <a:schemeClr val="bg1"/>
-                </a:solidFill>
-                <a:latin typeface="微软雅黑" panose="020B0503020204020204" charset="-122"/>
-                <a:ea typeface="微软雅黑" panose="020B0503020204020204" charset="-122"/>
-                <a:sym typeface="+mn-ea"/>
-              </a:rPr>
-              <a:t>Server</a:t>
-            </a:r>
-            <a:r>
-              <a:rPr lang="zh-CN" altLang="en-US" sz="2800" dirty="0">
-                <a:solidFill>
-                  <a:schemeClr val="bg1"/>
-                </a:solidFill>
-                <a:latin typeface="微软雅黑" panose="020B0503020204020204" charset="-122"/>
-                <a:ea typeface="微软雅黑" panose="020B0503020204020204" charset="-122"/>
-                <a:sym typeface="+mn-ea"/>
-              </a:rPr>
-              <a:t>或</a:t>
-            </a:r>
-            <a:r>
-              <a:rPr lang="en-US" altLang="zh-CN" sz="2800" dirty="0">
-                <a:solidFill>
-                  <a:schemeClr val="bg1"/>
-                </a:solidFill>
-                <a:latin typeface="微软雅黑" panose="020B0503020204020204" charset="-122"/>
-                <a:ea typeface="微软雅黑" panose="020B0503020204020204" charset="-122"/>
-                <a:sym typeface="+mn-ea"/>
-              </a:rPr>
-              <a:t>Client</a:t>
-            </a:r>
-            <a:r>
-              <a:rPr lang="zh-CN" altLang="en-US" sz="2800" dirty="0">
-                <a:solidFill>
-                  <a:schemeClr val="bg1"/>
-                </a:solidFill>
-                <a:latin typeface="微软雅黑" panose="020B0503020204020204" charset="-122"/>
-                <a:ea typeface="微软雅黑" panose="020B0503020204020204" charset="-122"/>
-                <a:sym typeface="+mn-ea"/>
-              </a:rPr>
-              <a:t>获取指令并处理，同时将本地数据交予</a:t>
-            </a:r>
-            <a:r>
-              <a:rPr lang="en-US" altLang="zh-CN" sz="2800" dirty="0">
-                <a:solidFill>
-                  <a:schemeClr val="bg1"/>
-                </a:solidFill>
-                <a:latin typeface="微软雅黑" panose="020B0503020204020204" charset="-122"/>
-                <a:ea typeface="微软雅黑" panose="020B0503020204020204" charset="-122"/>
-                <a:sym typeface="+mn-ea"/>
-              </a:rPr>
-              <a:t>Server</a:t>
-            </a:r>
-            <a:r>
-              <a:rPr lang="zh-CN" altLang="en-US" sz="2800" dirty="0">
-                <a:solidFill>
-                  <a:schemeClr val="bg1"/>
-                </a:solidFill>
-                <a:latin typeface="微软雅黑" panose="020B0503020204020204" charset="-122"/>
-                <a:ea typeface="微软雅黑" panose="020B0503020204020204" charset="-122"/>
-                <a:sym typeface="+mn-ea"/>
-              </a:rPr>
-              <a:t>或</a:t>
-            </a:r>
-            <a:r>
-              <a:rPr lang="en-US" altLang="zh-CN" sz="2800" dirty="0">
-                <a:solidFill>
-                  <a:schemeClr val="bg1"/>
-                </a:solidFill>
-                <a:latin typeface="微软雅黑" panose="020B0503020204020204" charset="-122"/>
-                <a:ea typeface="微软雅黑" panose="020B0503020204020204" charset="-122"/>
-                <a:sym typeface="+mn-ea"/>
-              </a:rPr>
-              <a:t>Client</a:t>
-            </a:r>
-            <a:r>
-              <a:rPr lang="zh-CN" altLang="en-US" sz="2800" dirty="0">
-                <a:solidFill>
-                  <a:schemeClr val="bg1"/>
-                </a:solidFill>
-                <a:latin typeface="微软雅黑" panose="020B0503020204020204" charset="-122"/>
-                <a:ea typeface="微软雅黑" panose="020B0503020204020204" charset="-122"/>
-                <a:sym typeface="+mn-ea"/>
-              </a:rPr>
-              <a:t>传输</a:t>
-            </a:r>
-          </a:p>
-          <a:p>
-            <a:r>
-              <a:rPr lang="zh-CN" altLang="en-US" sz="2800" dirty="0">
-                <a:solidFill>
-                  <a:schemeClr val="bg1"/>
-                </a:solidFill>
-                <a:latin typeface="微软雅黑" panose="020B0503020204020204" charset="-122"/>
-                <a:ea typeface="微软雅黑" panose="020B0503020204020204" charset="-122"/>
-                <a:sym typeface="+mn-ea"/>
-              </a:rPr>
-              <a:t>实现地图随小球滚动</a:t>
-            </a:r>
-          </a:p>
-          <a:p>
-            <a:r>
-              <a:rPr lang="zh-CN" altLang="en-US" sz="2800" dirty="0">
-                <a:solidFill>
-                  <a:schemeClr val="bg1"/>
-                </a:solidFill>
-                <a:latin typeface="微软雅黑" panose="020B0503020204020204" charset="-122"/>
-                <a:ea typeface="微软雅黑" panose="020B0503020204020204" charset="-122"/>
-                <a:sym typeface="+mn-ea"/>
-              </a:rPr>
-              <a:t>吞噬和生成新球的操作都是在</a:t>
-            </a:r>
-            <a:r>
-              <a:rPr lang="en-US" altLang="zh-CN" sz="2800" dirty="0" err="1">
-                <a:solidFill>
-                  <a:schemeClr val="bg1"/>
-                </a:solidFill>
-                <a:latin typeface="微软雅黑" panose="020B0503020204020204" charset="-122"/>
-                <a:ea typeface="微软雅黑" panose="020B0503020204020204" charset="-122"/>
-                <a:sym typeface="+mn-ea"/>
-              </a:rPr>
-              <a:t>GameControler</a:t>
-            </a:r>
-            <a:r>
-              <a:rPr lang="zh-CN" altLang="en-US" sz="2800" dirty="0">
-                <a:solidFill>
-                  <a:schemeClr val="bg1"/>
-                </a:solidFill>
-                <a:latin typeface="微软雅黑" panose="020B0503020204020204" charset="-122"/>
-                <a:ea typeface="微软雅黑" panose="020B0503020204020204" charset="-122"/>
-                <a:sym typeface="+mn-ea"/>
-              </a:rPr>
-              <a:t>类中进行</a:t>
-            </a:r>
-          </a:p>
-        </p:txBody>
-      </p:sp>
-      <p:sp>
-        <p:nvSpPr>
-          <p:cNvPr id="3" name="文本框 2"/>
-          <p:cNvSpPr txBox="1"/>
-          <p:nvPr/>
-        </p:nvSpPr>
-        <p:spPr>
-          <a:xfrm>
-            <a:off x="330200" y="369570"/>
-            <a:ext cx="3502660" cy="645160"/>
-          </a:xfrm>
-          <a:prstGeom prst="rect">
-            <a:avLst/>
-          </a:prstGeom>
-          <a:noFill/>
-        </p:spPr>
-        <p:txBody>
-          <a:bodyPr wrap="square" rtlCol="0">
-            <a:spAutoFit/>
-          </a:bodyPr>
-          <a:lstStyle/>
-          <a:p>
-            <a:r>
-              <a:rPr lang="en-US" altLang="zh-CN" sz="3600">
-                <a:solidFill>
-                  <a:schemeClr val="bg1"/>
-                </a:solidFill>
-                <a:latin typeface="微软雅黑" panose="020B0503020204020204" charset="-122"/>
-                <a:ea typeface="微软雅黑" panose="020B0503020204020204" charset="-122"/>
-              </a:rPr>
-              <a:t>Controler</a:t>
-            </a:r>
-            <a:r>
-              <a:rPr lang="zh-CN" altLang="en-US" sz="3600">
-                <a:solidFill>
-                  <a:schemeClr val="bg1"/>
-                </a:solidFill>
-                <a:latin typeface="微软雅黑" panose="020B0503020204020204" charset="-122"/>
-                <a:ea typeface="微软雅黑" panose="020B0503020204020204" charset="-122"/>
-              </a:rPr>
-              <a:t>类</a:t>
-            </a:r>
-          </a:p>
-        </p:txBody>
-      </p:sp>
-      <p:sp>
-        <p:nvSpPr>
-          <p:cNvPr id="12" name="椭圆 11"/>
-          <p:cNvSpPr/>
-          <p:nvPr/>
-        </p:nvSpPr>
-        <p:spPr>
-          <a:xfrm>
-            <a:off x="1109345" y="2388235"/>
-            <a:ext cx="132715" cy="132715"/>
-          </a:xfrm>
-          <a:prstGeom prst="ellipse">
-            <a:avLst/>
-          </a:prstGeom>
-        </p:spPr>
-        <p:style>
-          <a:lnRef idx="2">
-            <a:schemeClr val="accent1">
-              <a:shade val="50000"/>
-            </a:schemeClr>
-          </a:lnRef>
-          <a:fillRef idx="1">
-            <a:schemeClr val="accent1"/>
-          </a:fillRef>
-          <a:effectRef idx="0">
-            <a:schemeClr val="accent1"/>
-          </a:effectRef>
-          <a:fontRef idx="minor">
-            <a:schemeClr val="lt1"/>
-          </a:fontRef>
-        </p:style>
-        <p:txBody>
-          <a:bodyPr rtlCol="0" anchor="ctr"/>
-          <a:lstStyle/>
-          <a:p>
-            <a:pPr algn="ctr"/>
-            <a:endParaRPr lang="zh-CN" altLang="en-US"/>
-          </a:p>
-        </p:txBody>
-      </p:sp>
-      <p:sp>
-        <p:nvSpPr>
-          <p:cNvPr id="4" name="椭圆 3"/>
-          <p:cNvSpPr/>
-          <p:nvPr/>
-        </p:nvSpPr>
-        <p:spPr>
-          <a:xfrm>
-            <a:off x="1109345" y="3246120"/>
-            <a:ext cx="132715" cy="132715"/>
-          </a:xfrm>
-          <a:prstGeom prst="ellipse">
-            <a:avLst/>
-          </a:prstGeom>
-        </p:spPr>
-        <p:style>
-          <a:lnRef idx="2">
-            <a:schemeClr val="accent1">
-              <a:shade val="50000"/>
-            </a:schemeClr>
-          </a:lnRef>
-          <a:fillRef idx="1">
-            <a:schemeClr val="accent1"/>
-          </a:fillRef>
-          <a:effectRef idx="0">
-            <a:schemeClr val="accent1"/>
-          </a:effectRef>
-          <a:fontRef idx="minor">
-            <a:schemeClr val="lt1"/>
-          </a:fontRef>
-        </p:style>
-        <p:txBody>
-          <a:bodyPr rtlCol="0" anchor="ctr"/>
-          <a:lstStyle/>
-          <a:p>
-            <a:pPr algn="ctr"/>
-            <a:endParaRPr lang="zh-CN" altLang="en-US"/>
-          </a:p>
-        </p:txBody>
-      </p:sp>
-      <p:sp>
-        <p:nvSpPr>
-          <p:cNvPr id="6" name="椭圆 5"/>
-          <p:cNvSpPr/>
-          <p:nvPr/>
-        </p:nvSpPr>
-        <p:spPr>
-          <a:xfrm>
-            <a:off x="1109345" y="4086860"/>
-            <a:ext cx="132715" cy="132715"/>
-          </a:xfrm>
-          <a:prstGeom prst="ellipse">
-            <a:avLst/>
-          </a:prstGeom>
-        </p:spPr>
-        <p:style>
-          <a:lnRef idx="2">
-            <a:schemeClr val="accent1">
-              <a:shade val="50000"/>
-            </a:schemeClr>
-          </a:lnRef>
-          <a:fillRef idx="1">
-            <a:schemeClr val="accent1"/>
-          </a:fillRef>
-          <a:effectRef idx="0">
-            <a:schemeClr val="accent1"/>
-          </a:effectRef>
-          <a:fontRef idx="minor">
-            <a:schemeClr val="lt1"/>
-          </a:fontRef>
-        </p:style>
-        <p:txBody>
-          <a:bodyPr rtlCol="0" anchor="ctr"/>
-          <a:lstStyle/>
-          <a:p>
-            <a:pPr algn="ctr"/>
-            <a:endParaRPr lang="zh-CN" altLang="en-US"/>
-          </a:p>
-        </p:txBody>
-      </p:sp>
-    </p:spTree>
-  </p:cSld>
-  <p:clrMapOvr>
-    <a:masterClrMapping/>
-  </p:clrMapOvr>
-  <mc:AlternateContent xmlns:mc="http://schemas.openxmlformats.org/markup-compatibility/2006" xmlns:p14="http://schemas.microsoft.com/office/powerpoint/2010/main">
-    <mc:Choice Requires="p14">
-      <p:transition spd="slow" p14:dur="800">
-        <p:fade/>
-      </p:transition>
-    </mc:Choice>
-    <mc:Fallback xmlns="">
-      <p:transition spd="slow">
-        <p:fade/>
-      </p:transition>
-    </mc:Fallback>
-  </mc:AlternateContent>
 </p:sld>
 </file>
 

</xml_diff>

<commit_message>
amend the ppt file
</commit_message>
<xml_diff>
--- a/doc/答辩PPT.pptx
+++ b/doc/答辩PPT.pptx
@@ -4587,7 +4587,7 @@
           <a:p>
             <a:fld id="{DC6A92C0-FDED-9A46-AC7D-39DF6767893A}" type="datetimeFigureOut">
               <a:rPr kumimoji="1" lang="zh-CN" altLang="en-US" smtClean="0"/>
-              <a:t>2018/6/26</a:t>
+              <a:t>2018/6/28</a:t>
             </a:fld>
             <a:endParaRPr kumimoji="1" lang="zh-CN" altLang="en-US"/>
           </a:p>
@@ -12361,7 +12361,7 @@
         <p:spPr>
           <a:xfrm>
             <a:off x="1286510" y="2493645"/>
-            <a:ext cx="10027920" cy="1296670"/>
+            <a:ext cx="10027920" cy="630237"/>
           </a:xfrm>
           <a:prstGeom prst="rect">
             <a:avLst/>
@@ -12391,68 +12391,6 @@
               <a:t>服务端和客户端采用单例模式中的饿汉模式</a:t>
             </a:r>
           </a:p>
-          <a:p>
-            <a:pPr>
-              <a:lnSpc>
-                <a:spcPct val="140000"/>
-              </a:lnSpc>
-            </a:pPr>
-            <a:r>
-              <a:rPr lang="zh-CN" altLang="en-US" sz="2800" dirty="0">
-                <a:solidFill>
-                  <a:schemeClr val="bg1"/>
-                </a:solidFill>
-                <a:latin typeface="微软雅黑" panose="020B0503020204020204" charset="-122"/>
-                <a:ea typeface="微软雅黑" panose="020B0503020204020204" charset="-122"/>
-                <a:sym typeface="+mn-ea"/>
-              </a:rPr>
-              <a:t>其余所有类按</a:t>
-            </a:r>
-            <a:r>
-              <a:rPr lang="en-US" altLang="zh-CN" sz="2800" dirty="0">
-                <a:solidFill>
-                  <a:schemeClr val="bg1"/>
-                </a:solidFill>
-                <a:latin typeface="微软雅黑" panose="020B0503020204020204" charset="-122"/>
-                <a:ea typeface="微软雅黑" panose="020B0503020204020204" charset="-122"/>
-                <a:sym typeface="+mn-ea"/>
-              </a:rPr>
-              <a:t>cocos2dx</a:t>
-            </a:r>
-            <a:r>
-              <a:rPr lang="zh-CN" altLang="en-US" sz="2800" dirty="0">
-                <a:solidFill>
-                  <a:schemeClr val="bg1"/>
-                </a:solidFill>
-                <a:latin typeface="微软雅黑" panose="020B0503020204020204" charset="-122"/>
-                <a:ea typeface="微软雅黑" panose="020B0503020204020204" charset="-122"/>
-                <a:sym typeface="+mn-ea"/>
-              </a:rPr>
-              <a:t>中的</a:t>
-            </a:r>
-            <a:r>
-              <a:rPr lang="en-US" altLang="zh-CN" sz="2800" dirty="0">
-                <a:solidFill>
-                  <a:schemeClr val="bg1"/>
-                </a:solidFill>
-                <a:latin typeface="微软雅黑" panose="020B0503020204020204" charset="-122"/>
-                <a:ea typeface="微软雅黑" panose="020B0503020204020204" charset="-122"/>
-                <a:sym typeface="+mn-ea"/>
-              </a:rPr>
-              <a:t>Class</a:t>
-            </a:r>
-            <a:r>
-              <a:rPr lang="zh-CN" altLang="en-US" sz="2800" dirty="0">
-                <a:solidFill>
-                  <a:schemeClr val="bg1"/>
-                </a:solidFill>
-                <a:latin typeface="微软雅黑" panose="020B0503020204020204" charset="-122"/>
-                <a:ea typeface="微软雅黑" panose="020B0503020204020204" charset="-122"/>
-                <a:sym typeface="+mn-ea"/>
-              </a:rPr>
-              <a:t>写法采用工厂模式进行生成</a:t>
-            </a:r>
-          </a:p>
         </p:txBody>
       </p:sp>
       <p:sp>
@@ -12464,46 +12402,6 @@
         <p:spPr>
           <a:xfrm>
             <a:off x="974090" y="2785110"/>
-            <a:ext cx="132715" cy="132715"/>
-          </a:xfrm>
-          <a:prstGeom prst="ellipse">
-            <a:avLst/>
-          </a:prstGeom>
-        </p:spPr>
-        <p:style>
-          <a:lnRef idx="2">
-            <a:schemeClr val="accent1">
-              <a:shade val="50000"/>
-            </a:schemeClr>
-          </a:lnRef>
-          <a:fillRef idx="1">
-            <a:schemeClr val="accent1"/>
-          </a:fillRef>
-          <a:effectRef idx="0">
-            <a:schemeClr val="accent1"/>
-          </a:effectRef>
-          <a:fontRef idx="minor">
-            <a:schemeClr val="lt1"/>
-          </a:fontRef>
-        </p:style>
-        <p:txBody>
-          <a:bodyPr rtlCol="0" anchor="ctr"/>
-          <a:lstStyle/>
-          <a:p>
-            <a:pPr algn="ctr"/>
-            <a:endParaRPr lang="zh-CN" altLang="en-US"/>
-          </a:p>
-        </p:txBody>
-      </p:sp>
-      <p:sp>
-        <p:nvSpPr>
-          <p:cNvPr id="12" name="椭圆 11"/>
-          <p:cNvSpPr/>
-          <p:nvPr/>
-        </p:nvSpPr>
-        <p:spPr>
-          <a:xfrm>
-            <a:off x="974090" y="3494405"/>
             <a:ext cx="132715" cy="132715"/>
           </a:xfrm>
           <a:prstGeom prst="ellipse">
@@ -18661,92 +18559,6 @@
       </p:sp>
       <p:sp>
         <p:nvSpPr>
-          <p:cNvPr id="13" name="椭圆 12"/>
-          <p:cNvSpPr/>
-          <p:nvPr/>
-        </p:nvSpPr>
-        <p:spPr>
-          <a:xfrm>
-            <a:off x="6373495" y="4140200"/>
-            <a:ext cx="125095" cy="116205"/>
-          </a:xfrm>
-          <a:prstGeom prst="ellipse">
-            <a:avLst/>
-          </a:prstGeom>
-          <a:ln>
-            <a:noFill/>
-          </a:ln>
-        </p:spPr>
-        <p:style>
-          <a:lnRef idx="2">
-            <a:schemeClr val="accent1">
-              <a:shade val="50000"/>
-            </a:schemeClr>
-          </a:lnRef>
-          <a:fillRef idx="1">
-            <a:schemeClr val="accent1"/>
-          </a:fillRef>
-          <a:effectRef idx="0">
-            <a:schemeClr val="accent1"/>
-          </a:effectRef>
-          <a:fontRef idx="minor">
-            <a:schemeClr val="lt1"/>
-          </a:fontRef>
-        </p:style>
-        <p:txBody>
-          <a:bodyPr rtlCol="0" anchor="ctr"/>
-          <a:lstStyle/>
-          <a:p>
-            <a:pPr algn="ctr"/>
-            <a:endParaRPr lang="zh-CN" altLang="en-US"/>
-          </a:p>
-        </p:txBody>
-      </p:sp>
-      <p:sp>
-        <p:nvSpPr>
-          <p:cNvPr id="14" name="椭圆 13"/>
-          <p:cNvSpPr/>
-          <p:nvPr/>
-        </p:nvSpPr>
-        <p:spPr>
-          <a:xfrm>
-            <a:off x="6373495" y="4622165"/>
-            <a:ext cx="125095" cy="116205"/>
-          </a:xfrm>
-          <a:prstGeom prst="ellipse">
-            <a:avLst/>
-          </a:prstGeom>
-          <a:ln>
-            <a:noFill/>
-          </a:ln>
-        </p:spPr>
-        <p:style>
-          <a:lnRef idx="2">
-            <a:schemeClr val="accent1">
-              <a:shade val="50000"/>
-            </a:schemeClr>
-          </a:lnRef>
-          <a:fillRef idx="1">
-            <a:schemeClr val="accent1"/>
-          </a:fillRef>
-          <a:effectRef idx="0">
-            <a:schemeClr val="accent1"/>
-          </a:effectRef>
-          <a:fontRef idx="minor">
-            <a:schemeClr val="lt1"/>
-          </a:fontRef>
-        </p:style>
-        <p:txBody>
-          <a:bodyPr rtlCol="0" anchor="ctr"/>
-          <a:lstStyle/>
-          <a:p>
-            <a:pPr algn="ctr"/>
-            <a:endParaRPr lang="zh-CN" altLang="en-US"/>
-          </a:p>
-        </p:txBody>
-      </p:sp>
-      <p:sp>
-        <p:nvSpPr>
           <p:cNvPr id="15" name="椭圆 14"/>
           <p:cNvSpPr/>
           <p:nvPr/>
@@ -19225,7 +19037,7 @@
         <p:spPr>
           <a:xfrm>
             <a:off x="6842196" y="2107323"/>
-            <a:ext cx="4346791" cy="4837430"/>
+            <a:ext cx="4346791" cy="4254498"/>
           </a:xfrm>
           <a:prstGeom prst="rect">
             <a:avLst/>
@@ -19309,23 +19121,6 @@
                 <a:ea typeface="微软雅黑" panose="020B0503020204020204" charset="-122"/>
               </a:rPr>
               <a:t>设计</a:t>
-            </a:r>
-          </a:p>
-          <a:p>
-            <a:pPr algn="l">
-              <a:lnSpc>
-                <a:spcPct val="130000"/>
-              </a:lnSpc>
-            </a:pPr>
-            <a:r>
-              <a:rPr lang="en-US" altLang="zh-CN" sz="2800" dirty="0">
-                <a:solidFill>
-                  <a:schemeClr val="bg1"/>
-                </a:solidFill>
-                <a:latin typeface="微软雅黑" panose="020B0503020204020204" charset="-122"/>
-                <a:ea typeface="微软雅黑" panose="020B0503020204020204" charset="-122"/>
-              </a:rPr>
-              <a:t>Server  Client</a:t>
             </a:r>
           </a:p>
           <a:p>
@@ -19626,49 +19421,6 @@
         <p:spPr>
           <a:xfrm>
             <a:off x="6625590" y="4067175"/>
-            <a:ext cx="125095" cy="116205"/>
-          </a:xfrm>
-          <a:prstGeom prst="ellipse">
-            <a:avLst/>
-          </a:prstGeom>
-          <a:ln>
-            <a:noFill/>
-          </a:ln>
-        </p:spPr>
-        <p:style>
-          <a:lnRef idx="2">
-            <a:schemeClr val="accent1">
-              <a:shade val="50000"/>
-            </a:schemeClr>
-          </a:lnRef>
-          <a:fillRef idx="1">
-            <a:schemeClr val="accent1"/>
-          </a:fillRef>
-          <a:effectRef idx="0">
-            <a:schemeClr val="accent1"/>
-          </a:effectRef>
-          <a:fontRef idx="minor">
-            <a:schemeClr val="lt1"/>
-          </a:fontRef>
-        </p:style>
-        <p:txBody>
-          <a:bodyPr rtlCol="0" anchor="ctr"/>
-          <a:lstStyle/>
-          <a:p>
-            <a:pPr algn="ctr"/>
-            <a:endParaRPr lang="zh-CN" altLang="en-US"/>
-          </a:p>
-        </p:txBody>
-      </p:sp>
-      <p:sp>
-        <p:nvSpPr>
-          <p:cNvPr id="11" name="椭圆 10"/>
-          <p:cNvSpPr/>
-          <p:nvPr/>
-        </p:nvSpPr>
-        <p:spPr>
-          <a:xfrm>
-            <a:off x="6625590" y="5255895"/>
             <a:ext cx="125095" cy="116205"/>
           </a:xfrm>
           <a:prstGeom prst="ellipse">

</xml_diff>